<commit_message>
Ažurirana prezentacija za obranu projektnog prijedloga.
</commit_message>
<xml_diff>
--- a/projektni_prijedlog.pptx
+++ b/projektni_prijedlog.pptx
@@ -107,6 +107,22 @@
       </a:defRPr>
     </a:lvl9pPr>
   </p:defaultTextStyle>
+  <p:extLst>
+    <p:ext uri="{EFAFB233-063F-42B5-8137-9DF3F51BA10A}">
+      <p15:sldGuideLst xmlns:p15="http://schemas.microsoft.com/office/powerpoint/2012/main">
+        <p15:guide id="1" orient="horz" pos="2160">
+          <p15:clr>
+            <a:srgbClr val="A4A3A4"/>
+          </p15:clr>
+        </p15:guide>
+        <p15:guide id="2" pos="2880">
+          <p15:clr>
+            <a:srgbClr val="A4A3A4"/>
+          </p15:clr>
+        </p15:guide>
+      </p15:sldGuideLst>
+    </p:ext>
+  </p:extLst>
 </p:presentation>
 </file>
 
@@ -247,7 +263,7 @@
           <a:p>
             <a:fld id="{557DEB3A-3646-4146-B11C-EF275AA02866}" type="datetimeFigureOut">
               <a:rPr lang="en-US" smtClean="0"/>
-              <a:t>4/15/2019</a:t>
+              <a:t>4/19/2019</a:t>
             </a:fld>
             <a:endParaRPr lang="en-US"/>
           </a:p>
@@ -1116,7 +1132,7 @@
           <a:p>
             <a:fld id="{557DEB3A-3646-4146-B11C-EF275AA02866}" type="datetimeFigureOut">
               <a:rPr lang="en-US" smtClean="0"/>
-              <a:t>4/15/2019</a:t>
+              <a:t>4/19/2019</a:t>
             </a:fld>
             <a:endParaRPr lang="en-US"/>
           </a:p>
@@ -1291,7 +1307,7 @@
           <a:p>
             <a:fld id="{557DEB3A-3646-4146-B11C-EF275AA02866}" type="datetimeFigureOut">
               <a:rPr lang="en-US" smtClean="0"/>
-              <a:t>4/15/2019</a:t>
+              <a:t>4/19/2019</a:t>
             </a:fld>
             <a:endParaRPr lang="en-US"/>
           </a:p>
@@ -1461,7 +1477,7 @@
           <a:p>
             <a:fld id="{557DEB3A-3646-4146-B11C-EF275AA02866}" type="datetimeFigureOut">
               <a:rPr lang="en-US" smtClean="0"/>
-              <a:t>4/15/2019</a:t>
+              <a:t>4/19/2019</a:t>
             </a:fld>
             <a:endParaRPr lang="en-US"/>
           </a:p>
@@ -1671,7 +1687,7 @@
           <a:p>
             <a:fld id="{557DEB3A-3646-4146-B11C-EF275AA02866}" type="datetimeFigureOut">
               <a:rPr lang="en-US" smtClean="0"/>
-              <a:t>4/15/2019</a:t>
+              <a:t>4/19/2019</a:t>
             </a:fld>
             <a:endParaRPr lang="en-US"/>
           </a:p>
@@ -2485,7 +2501,7 @@
           <a:p>
             <a:fld id="{557DEB3A-3646-4146-B11C-EF275AA02866}" type="datetimeFigureOut">
               <a:rPr lang="en-US" smtClean="0"/>
-              <a:t>4/15/2019</a:t>
+              <a:t>4/19/2019</a:t>
             </a:fld>
             <a:endParaRPr lang="en-US"/>
           </a:p>
@@ -2721,7 +2737,7 @@
           <a:p>
             <a:fld id="{557DEB3A-3646-4146-B11C-EF275AA02866}" type="datetimeFigureOut">
               <a:rPr lang="en-US" smtClean="0"/>
-              <a:t>4/15/2019</a:t>
+              <a:t>4/19/2019</a:t>
             </a:fld>
             <a:endParaRPr lang="en-US"/>
           </a:p>
@@ -3044,7 +3060,7 @@
           <a:p>
             <a:fld id="{557DEB3A-3646-4146-B11C-EF275AA02866}" type="datetimeFigureOut">
               <a:rPr lang="en-US" smtClean="0"/>
-              <a:t>4/15/2019</a:t>
+              <a:t>4/19/2019</a:t>
             </a:fld>
             <a:endParaRPr lang="en-US"/>
           </a:p>
@@ -3134,7 +3150,7 @@
           <a:p>
             <a:fld id="{557DEB3A-3646-4146-B11C-EF275AA02866}" type="datetimeFigureOut">
               <a:rPr lang="en-US" smtClean="0"/>
-              <a:t>4/15/2019</a:t>
+              <a:t>4/19/2019</a:t>
             </a:fld>
             <a:endParaRPr lang="en-US"/>
           </a:p>
@@ -3651,7 +3667,7 @@
           <a:p>
             <a:fld id="{557DEB3A-3646-4146-B11C-EF275AA02866}" type="datetimeFigureOut">
               <a:rPr lang="en-US" smtClean="0"/>
-              <a:t>4/15/2019</a:t>
+              <a:t>4/19/2019</a:t>
             </a:fld>
             <a:endParaRPr lang="en-US"/>
           </a:p>
@@ -4162,7 +4178,7 @@
           <a:p>
             <a:fld id="{557DEB3A-3646-4146-B11C-EF275AA02866}" type="datetimeFigureOut">
               <a:rPr lang="en-US" smtClean="0"/>
-              <a:t>4/15/2019</a:t>
+              <a:t>4/19/2019</a:t>
             </a:fld>
             <a:endParaRPr lang="en-US"/>
           </a:p>
@@ -4407,7 +4423,7 @@
           <a:p>
             <a:fld id="{557DEB3A-3646-4146-B11C-EF275AA02866}" type="datetimeFigureOut">
               <a:rPr lang="en-US" smtClean="0"/>
-              <a:t>4/15/2019</a:t>
+              <a:t>4/19/2019</a:t>
             </a:fld>
             <a:endParaRPr lang="en-US"/>
           </a:p>
@@ -5030,36 +5046,37 @@
           <a:lstStyle/>
           <a:p>
             <a:r>
-              <a:rPr lang="en-US" dirty="0" err="1" smtClean="0"/>
-              <a:t>Strojno</a:t>
-            </a:r>
-            <a:r>
-              <a:rPr lang="en-US" dirty="0" smtClean="0"/>
+              <a:rPr lang="hr-HR" dirty="0" smtClean="0"/>
+              <a:t>Strojno učenje</a:t>
+            </a:r>
+            <a:br>
+              <a:rPr lang="hr-HR" dirty="0" smtClean="0"/>
+            </a:br>
+            <a:r>
+              <a:rPr lang="hr-HR" dirty="0" smtClean="0"/>
+              <a:t>Mozgalo: </a:t>
+            </a:r>
+            <a:r>
+              <a:rPr lang="hr-HR" dirty="0" err="1" smtClean="0"/>
+              <a:t>Client</a:t>
+            </a:r>
+            <a:r>
+              <a:rPr lang="hr-HR" dirty="0" smtClean="0"/>
               <a:t> </a:t>
             </a:r>
             <a:r>
-              <a:rPr lang="en-US" dirty="0" err="1" smtClean="0"/>
-              <a:t>učenje</a:t>
-            </a:r>
-            <a:r>
-              <a:rPr lang="en-US" dirty="0" smtClean="0"/>
-              <a:t/>
-            </a:r>
-            <a:br>
-              <a:rPr lang="en-US" dirty="0" smtClean="0"/>
-            </a:br>
-            <a:r>
-              <a:rPr lang="en-US" dirty="0" err="1" smtClean="0"/>
-              <a:t>Mozgalo</a:t>
-            </a:r>
-            <a:r>
-              <a:rPr lang="en-US" dirty="0" smtClean="0"/>
-              <a:t>: </a:t>
-            </a:r>
-            <a:r>
-              <a:rPr lang="en-US" dirty="0"/>
-              <a:t>Client Behavior Prediction</a:t>
-            </a:r>
+              <a:rPr lang="hr-HR" dirty="0" err="1" smtClean="0"/>
+              <a:t>Behavior</a:t>
+            </a:r>
+            <a:r>
+              <a:rPr lang="hr-HR" dirty="0" smtClean="0"/>
+              <a:t> </a:t>
+            </a:r>
+            <a:r>
+              <a:rPr lang="hr-HR" dirty="0" err="1" smtClean="0"/>
+              <a:t>Prediction</a:t>
+            </a:r>
+            <a:endParaRPr lang="hr-HR" dirty="0"/>
           </a:p>
         </p:txBody>
       </p:sp>
@@ -5081,55 +5098,42 @@
           <a:lstStyle/>
           <a:p>
             <a:r>
-              <a:rPr lang="en-US" dirty="0" smtClean="0"/>
+              <a:rPr lang="hr-HR" dirty="0" smtClean="0"/>
               <a:t>Elena </a:t>
             </a:r>
             <a:r>
-              <a:rPr lang="en-US" dirty="0" err="1" smtClean="0"/>
+              <a:rPr lang="hr-HR" dirty="0" err="1" smtClean="0"/>
               <a:t>Murljačić</a:t>
             </a:r>
-            <a:endParaRPr lang="en-US" dirty="0" smtClean="0"/>
-          </a:p>
-          <a:p>
-            <a:r>
-              <a:rPr lang="en-US" dirty="0" err="1" smtClean="0"/>
+            <a:endParaRPr lang="hr-HR" dirty="0" smtClean="0"/>
+          </a:p>
+          <a:p>
+            <a:r>
+              <a:rPr lang="hr-HR" dirty="0" err="1" smtClean="0"/>
               <a:t>Dorotea</a:t>
             </a:r>
             <a:r>
-              <a:rPr lang="en-US" dirty="0" smtClean="0"/>
+              <a:rPr lang="hr-HR" dirty="0" smtClean="0"/>
               <a:t> </a:t>
             </a:r>
             <a:r>
-              <a:rPr lang="en-US" dirty="0" err="1" smtClean="0"/>
+              <a:rPr lang="hr-HR" dirty="0" err="1" smtClean="0"/>
               <a:t>Rajšel</a:t>
             </a:r>
-            <a:endParaRPr lang="en-US" dirty="0" smtClean="0"/>
-          </a:p>
-          <a:p>
-            <a:r>
-              <a:rPr lang="en-US" dirty="0" err="1" smtClean="0"/>
-              <a:t>Darija</a:t>
-            </a:r>
-            <a:r>
-              <a:rPr lang="en-US" dirty="0" smtClean="0"/>
-              <a:t> </a:t>
-            </a:r>
-            <a:r>
-              <a:rPr lang="en-US" dirty="0" err="1" smtClean="0"/>
-              <a:t>Strmečki</a:t>
-            </a:r>
-            <a:endParaRPr lang="en-US" dirty="0" smtClean="0"/>
-          </a:p>
-          <a:p>
-            <a:r>
-              <a:rPr lang="en-US" dirty="0" smtClean="0"/>
-              <a:t>Petra </a:t>
-            </a:r>
-            <a:r>
-              <a:rPr lang="en-US" dirty="0" err="1" smtClean="0"/>
-              <a:t>Vlaić</a:t>
-            </a:r>
-            <a:endParaRPr lang="en-US" dirty="0"/>
+            <a:endParaRPr lang="hr-HR" dirty="0" smtClean="0"/>
+          </a:p>
+          <a:p>
+            <a:r>
+              <a:rPr lang="hr-HR" dirty="0" smtClean="0"/>
+              <a:t>Darija Strmečki</a:t>
+            </a:r>
+          </a:p>
+          <a:p>
+            <a:r>
+              <a:rPr lang="hr-HR" dirty="0" smtClean="0"/>
+              <a:t>Petra Vlaić</a:t>
+            </a:r>
+            <a:endParaRPr lang="hr-HR" dirty="0"/>
           </a:p>
         </p:txBody>
       </p:sp>
@@ -5179,14 +5183,10 @@
           <a:lstStyle/>
           <a:p>
             <a:r>
-              <a:rPr lang="en-US" dirty="0" err="1" smtClean="0"/>
-              <a:t>Zadatak</a:t>
-            </a:r>
-            <a:r>
-              <a:rPr lang="en-US" dirty="0" smtClean="0"/>
-              <a:t>	</a:t>
-            </a:r>
-            <a:endParaRPr lang="en-US" dirty="0"/>
+              <a:rPr lang="hr-HR" dirty="0" smtClean="0"/>
+              <a:t>Zadatak	</a:t>
+            </a:r>
+            <a:endParaRPr lang="hr-HR" dirty="0"/>
           </a:p>
         </p:txBody>
       </p:sp>
@@ -5206,164 +5206,62 @@
           <a:lstStyle/>
           <a:p>
             <a:r>
-              <a:rPr lang="en-US" dirty="0" err="1" smtClean="0"/>
-              <a:t>Predvidjeti</a:t>
-            </a:r>
-            <a:r>
-              <a:rPr lang="en-US" dirty="0" smtClean="0"/>
-              <a:t> </a:t>
-            </a:r>
-            <a:r>
-              <a:rPr lang="en-US" dirty="0" err="1" smtClean="0"/>
-              <a:t>ponašanje</a:t>
-            </a:r>
-            <a:r>
-              <a:rPr lang="en-US" dirty="0" smtClean="0"/>
-              <a:t> </a:t>
-            </a:r>
-            <a:r>
-              <a:rPr lang="en-US" dirty="0" err="1" smtClean="0"/>
-              <a:t>klijenata</a:t>
-            </a:r>
-            <a:endParaRPr lang="en-US" dirty="0" smtClean="0"/>
+              <a:rPr lang="hr-HR" dirty="0" smtClean="0"/>
+              <a:t>Predvidjeti ponašanje klijenata</a:t>
+            </a:r>
           </a:p>
           <a:p>
             <a:pPr lvl="1"/>
             <a:r>
-              <a:rPr lang="en-US" dirty="0" err="1" smtClean="0"/>
-              <a:t>Prijevremene</a:t>
-            </a:r>
-            <a:r>
-              <a:rPr lang="en-US" dirty="0" smtClean="0"/>
-              <a:t> </a:t>
-            </a:r>
-            <a:r>
-              <a:rPr lang="en-US" dirty="0" err="1" smtClean="0"/>
-              <a:t>otplate</a:t>
-            </a:r>
-            <a:r>
-              <a:rPr lang="en-US" dirty="0" smtClean="0"/>
-              <a:t> </a:t>
-            </a:r>
-            <a:r>
-              <a:rPr lang="en-US" dirty="0" err="1" smtClean="0"/>
-              <a:t>kredita</a:t>
-            </a:r>
-            <a:endParaRPr lang="en-US" dirty="0" smtClean="0"/>
+              <a:rPr lang="hr-HR" dirty="0" smtClean="0"/>
+              <a:t>Prijevremene otplate kredita</a:t>
+            </a:r>
           </a:p>
           <a:p>
             <a:pPr lvl="1"/>
             <a:r>
-              <a:rPr lang="en-US" dirty="0" err="1" smtClean="0"/>
-              <a:t>Produženje</a:t>
-            </a:r>
-            <a:r>
-              <a:rPr lang="en-US" dirty="0" smtClean="0"/>
-              <a:t> </a:t>
-            </a:r>
-            <a:r>
-              <a:rPr lang="en-US" dirty="0" err="1" smtClean="0"/>
-              <a:t>oročenog</a:t>
-            </a:r>
-            <a:r>
-              <a:rPr lang="en-US" dirty="0" smtClean="0"/>
-              <a:t> </a:t>
-            </a:r>
-            <a:r>
-              <a:rPr lang="en-US" dirty="0" err="1" smtClean="0"/>
+              <a:rPr lang="hr-HR" dirty="0" smtClean="0"/>
+              <a:t>Produženje oročenog </a:t>
+            </a:r>
+            <a:r>
+              <a:rPr lang="hr-HR" dirty="0" smtClean="0"/>
               <a:t>depozita</a:t>
             </a:r>
-            <a:endParaRPr lang="en-US" dirty="0" smtClean="0"/>
-          </a:p>
-          <a:p>
-            <a:r>
-              <a:rPr lang="en-US" dirty="0" err="1" smtClean="0"/>
+          </a:p>
+          <a:p>
+            <a:pPr lvl="1"/>
+            <a:r>
+              <a:rPr lang="hr-HR" dirty="0" smtClean="0"/>
+              <a:t>Klasifikacijski problem</a:t>
+            </a:r>
+            <a:endParaRPr lang="hr-HR" dirty="0" smtClean="0"/>
+          </a:p>
+          <a:p>
+            <a:endParaRPr lang="hr-HR" dirty="0"/>
+          </a:p>
+          <a:p>
+            <a:r>
+              <a:rPr lang="hr-HR" dirty="0" smtClean="0"/>
               <a:t>Cilj</a:t>
             </a:r>
             <a:r>
-              <a:rPr lang="en-US" dirty="0" smtClean="0"/>
+              <a:rPr lang="hr-HR" dirty="0" smtClean="0"/>
               <a:t>: </a:t>
             </a:r>
           </a:p>
           <a:p>
             <a:pPr lvl="1"/>
             <a:r>
-              <a:rPr lang="en-US" dirty="0" err="1" smtClean="0"/>
-              <a:t>Prilagoditi</a:t>
-            </a:r>
-            <a:r>
-              <a:rPr lang="en-US" dirty="0" smtClean="0"/>
-              <a:t> </a:t>
-            </a:r>
-            <a:r>
-              <a:rPr lang="en-US" dirty="0" err="1" smtClean="0"/>
-              <a:t>ponudu</a:t>
-            </a:r>
-            <a:r>
-              <a:rPr lang="en-US" dirty="0" smtClean="0"/>
-              <a:t> </a:t>
-            </a:r>
-            <a:r>
-              <a:rPr lang="en-US" dirty="0" err="1" smtClean="0"/>
-              <a:t>novonastalim</a:t>
-            </a:r>
-            <a:r>
-              <a:rPr lang="en-US" dirty="0" smtClean="0"/>
-              <a:t> </a:t>
-            </a:r>
-            <a:r>
-              <a:rPr lang="en-US" dirty="0" err="1" smtClean="0"/>
-              <a:t>uvjetima</a:t>
-            </a:r>
-            <a:endParaRPr lang="en-US" dirty="0" smtClean="0"/>
+              <a:rPr lang="hr-HR" dirty="0" smtClean="0"/>
+              <a:t>Prilagoditi ponudu novonastalim uvjetima</a:t>
+            </a:r>
           </a:p>
           <a:p>
             <a:pPr lvl="1"/>
             <a:r>
-              <a:rPr lang="en-US" dirty="0" err="1" smtClean="0"/>
-              <a:t>Umanjiti</a:t>
-            </a:r>
-            <a:r>
-              <a:rPr lang="en-US" dirty="0" smtClean="0"/>
-              <a:t> </a:t>
-            </a:r>
-            <a:r>
-              <a:rPr lang="en-US" dirty="0" err="1" smtClean="0"/>
-              <a:t>negativne</a:t>
-            </a:r>
-            <a:r>
-              <a:rPr lang="en-US" dirty="0" smtClean="0"/>
-              <a:t> </a:t>
-            </a:r>
-            <a:r>
-              <a:rPr lang="en-US" dirty="0" err="1" smtClean="0"/>
-              <a:t>efekte</a:t>
-            </a:r>
-            <a:r>
-              <a:rPr lang="en-US" dirty="0"/>
-              <a:t> </a:t>
-            </a:r>
-            <a:r>
-              <a:rPr lang="en-US" dirty="0" err="1" smtClean="0"/>
-              <a:t>na</a:t>
-            </a:r>
-            <a:r>
-              <a:rPr lang="en-US" dirty="0" smtClean="0"/>
-              <a:t> </a:t>
-            </a:r>
-            <a:r>
-              <a:rPr lang="en-US" dirty="0" err="1" smtClean="0"/>
-              <a:t>financijski</a:t>
-            </a:r>
-            <a:r>
-              <a:rPr lang="en-US" dirty="0" smtClean="0"/>
-              <a:t> </a:t>
-            </a:r>
-            <a:r>
-              <a:rPr lang="en-US" dirty="0" err="1" smtClean="0"/>
-              <a:t>rezultat</a:t>
-            </a:r>
-            <a:endParaRPr lang="en-US" dirty="0" smtClean="0"/>
+              <a:rPr lang="hr-HR" dirty="0" smtClean="0"/>
+              <a:t>Umanjiti negativne efekte na financijski rezultat</a:t>
+            </a:r>
           </a:p>
         </p:txBody>
       </p:sp>
@@ -5413,10 +5311,10 @@
           <a:lstStyle/>
           <a:p>
             <a:r>
-              <a:rPr lang="en-US" dirty="0" err="1" smtClean="0"/>
+              <a:rPr lang="hr-HR" dirty="0" smtClean="0"/>
               <a:t>Metodika</a:t>
             </a:r>
-            <a:endParaRPr lang="en-US" dirty="0"/>
+            <a:endParaRPr lang="hr-HR" dirty="0"/>
           </a:p>
         </p:txBody>
       </p:sp>
@@ -5436,66 +5334,51 @@
           <a:lstStyle/>
           <a:p>
             <a:r>
-              <a:rPr lang="en-US" dirty="0" err="1" smtClean="0"/>
-              <a:t>Slučajne</a:t>
-            </a:r>
-            <a:r>
-              <a:rPr lang="en-US" dirty="0" smtClean="0"/>
+              <a:rPr lang="hr-HR" dirty="0" smtClean="0"/>
+              <a:t>Slučajne </a:t>
+            </a:r>
+            <a:r>
+              <a:rPr lang="hr-HR" dirty="0" smtClean="0"/>
+              <a:t>šume</a:t>
+            </a:r>
+          </a:p>
+          <a:p>
+            <a:r>
+              <a:rPr lang="hr-HR" dirty="0" smtClean="0"/>
+              <a:t>Ansambl metode</a:t>
+            </a:r>
+          </a:p>
+          <a:p>
+            <a:r>
+              <a:rPr lang="hr-HR" dirty="0" smtClean="0"/>
+              <a:t>Neuronske mreže</a:t>
+            </a:r>
+          </a:p>
+          <a:p>
+            <a:endParaRPr lang="hr-HR" dirty="0" smtClean="0"/>
+          </a:p>
+          <a:p>
+            <a:r>
+              <a:rPr lang="hr-HR" dirty="0" err="1" smtClean="0"/>
+              <a:t>Python</a:t>
+            </a:r>
+            <a:r>
+              <a:rPr lang="hr-HR" dirty="0" smtClean="0"/>
+              <a:t> – </a:t>
+            </a:r>
+            <a:r>
+              <a:rPr lang="hr-HR" dirty="0" err="1" smtClean="0"/>
+              <a:t>Jupyter</a:t>
+            </a:r>
+            <a:r>
+              <a:rPr lang="hr-HR" dirty="0" smtClean="0"/>
               <a:t> </a:t>
             </a:r>
             <a:r>
-              <a:rPr lang="en-US" dirty="0" err="1" smtClean="0"/>
-              <a:t>šume</a:t>
-            </a:r>
-            <a:endParaRPr lang="en-US" dirty="0" smtClean="0"/>
-          </a:p>
-          <a:p>
-            <a:r>
-              <a:rPr lang="en-US" dirty="0" err="1" smtClean="0"/>
-              <a:t>Ansambl</a:t>
-            </a:r>
-            <a:r>
-              <a:rPr lang="en-US" dirty="0" smtClean="0"/>
-              <a:t> </a:t>
-            </a:r>
-            <a:r>
-              <a:rPr lang="en-US" dirty="0" err="1" smtClean="0"/>
-              <a:t>metode</a:t>
-            </a:r>
-            <a:endParaRPr lang="en-US" dirty="0" smtClean="0"/>
-          </a:p>
-          <a:p>
-            <a:r>
-              <a:rPr lang="en-US" dirty="0" err="1" smtClean="0"/>
-              <a:t>Neuronske</a:t>
-            </a:r>
-            <a:r>
-              <a:rPr lang="en-US" dirty="0" smtClean="0"/>
-              <a:t> </a:t>
-            </a:r>
-            <a:r>
-              <a:rPr lang="en-US" dirty="0" err="1" smtClean="0"/>
-              <a:t>mreže</a:t>
-            </a:r>
-            <a:endParaRPr lang="en-US" dirty="0" smtClean="0"/>
-          </a:p>
-          <a:p>
-            <a:endParaRPr lang="en-US" dirty="0"/>
-          </a:p>
-          <a:p>
-            <a:r>
-              <a:rPr lang="en-US" dirty="0" smtClean="0"/>
-              <a:t>Python – </a:t>
-            </a:r>
-            <a:r>
-              <a:rPr lang="en-US" dirty="0" err="1" smtClean="0"/>
-              <a:t>Jupyter</a:t>
-            </a:r>
-            <a:r>
-              <a:rPr lang="en-US" dirty="0" smtClean="0"/>
-              <a:t> Notebook</a:t>
-            </a:r>
-            <a:endParaRPr lang="en-US" dirty="0"/>
+              <a:rPr lang="hr-HR" dirty="0" err="1" smtClean="0"/>
+              <a:t>Notebook</a:t>
+            </a:r>
+            <a:endParaRPr lang="hr-HR" dirty="0"/>
           </a:p>
         </p:txBody>
       </p:sp>
@@ -5545,98 +5428,123 @@
           <a:lstStyle/>
           <a:p>
             <a:r>
-              <a:rPr lang="en-US" dirty="0" err="1" smtClean="0"/>
-              <a:t>Očekivani</a:t>
-            </a:r>
-            <a:r>
-              <a:rPr lang="en-US" dirty="0" smtClean="0"/>
+              <a:rPr lang="hr-HR" dirty="0" smtClean="0"/>
+              <a:t>Očekivani rezultati</a:t>
+            </a:r>
+            <a:endParaRPr lang="hr-HR" dirty="0"/>
+          </a:p>
+        </p:txBody>
+      </p:sp>
+      <p:sp>
+        <p:nvSpPr>
+          <p:cNvPr id="3" name="Content Placeholder 2"/>
+          <p:cNvSpPr>
+            <a:spLocks noGrp="1"/>
+          </p:cNvSpPr>
+          <p:nvPr>
+            <p:ph sz="quarter" idx="1"/>
+          </p:nvPr>
+        </p:nvSpPr>
+        <p:spPr/>
+        <p:txBody>
+          <a:bodyPr/>
+          <a:lstStyle/>
+          <a:p>
+            <a:r>
+              <a:rPr lang="hr-HR" dirty="0" smtClean="0"/>
+              <a:t>Slična</a:t>
+            </a:r>
+            <a:r>
+              <a:rPr lang="hr-HR" dirty="0" smtClean="0"/>
+              <a:t> istraživanja:</a:t>
+            </a:r>
+          </a:p>
+          <a:p>
+            <a:pPr lvl="1"/>
+            <a:r>
+              <a:rPr lang="hr-HR" dirty="0" smtClean="0"/>
+              <a:t>„</a:t>
+            </a:r>
+            <a:r>
+              <a:rPr lang="hr-HR" dirty="0" err="1" smtClean="0"/>
+              <a:t>customer</a:t>
+            </a:r>
+            <a:r>
+              <a:rPr lang="hr-HR" dirty="0" smtClean="0"/>
               <a:t> </a:t>
             </a:r>
             <a:r>
-              <a:rPr lang="en-US" dirty="0" err="1" smtClean="0"/>
-              <a:t>rezultati</a:t>
-            </a:r>
-            <a:endParaRPr lang="en-US" dirty="0"/>
-          </a:p>
-        </p:txBody>
-      </p:sp>
-      <p:sp>
-        <p:nvSpPr>
-          <p:cNvPr id="3" name="Content Placeholder 2"/>
-          <p:cNvSpPr>
-            <a:spLocks noGrp="1"/>
-          </p:cNvSpPr>
-          <p:nvPr>
-            <p:ph sz="quarter" idx="1"/>
-          </p:nvPr>
-        </p:nvSpPr>
-        <p:spPr/>
-        <p:txBody>
-          <a:bodyPr/>
-          <a:lstStyle/>
-          <a:p>
-            <a:r>
-              <a:rPr lang="en-US" dirty="0" smtClean="0"/>
-              <a:t>Ne </a:t>
-            </a:r>
-            <a:r>
-              <a:rPr lang="en-US" dirty="0" err="1" smtClean="0"/>
-              <a:t>postoje</a:t>
-            </a:r>
-            <a:r>
-              <a:rPr lang="en-US" dirty="0" smtClean="0"/>
+              <a:rPr lang="hr-HR" dirty="0" err="1" smtClean="0"/>
+              <a:t>churn</a:t>
+            </a:r>
+            <a:r>
+              <a:rPr lang="hr-HR" dirty="0" smtClean="0"/>
               <a:t> </a:t>
             </a:r>
             <a:r>
-              <a:rPr lang="en-US" dirty="0" err="1" smtClean="0"/>
-              <a:t>prethodna</a:t>
-            </a:r>
-            <a:r>
-              <a:rPr lang="en-US" dirty="0" smtClean="0"/>
-              <a:t> </a:t>
-            </a:r>
-            <a:r>
-              <a:rPr lang="en-US" dirty="0" err="1" smtClean="0"/>
-              <a:t>istraživanja</a:t>
-            </a:r>
-            <a:endParaRPr lang="en-US" dirty="0" smtClean="0"/>
-          </a:p>
-          <a:p>
-            <a:r>
-              <a:rPr lang="en-US" dirty="0" err="1" smtClean="0"/>
-              <a:t>Ocjena</a:t>
-            </a:r>
-            <a:r>
-              <a:rPr lang="en-US" dirty="0" smtClean="0"/>
-              <a:t> </a:t>
-            </a:r>
-            <a:r>
-              <a:rPr lang="en-US" dirty="0" err="1" smtClean="0"/>
-              <a:t>uspješnosti</a:t>
-            </a:r>
-            <a:r>
-              <a:rPr lang="en-US" dirty="0" smtClean="0"/>
-              <a:t>: F1 score</a:t>
-            </a:r>
-          </a:p>
-          <a:p>
-            <a:r>
-              <a:rPr lang="en-US" dirty="0" err="1" smtClean="0"/>
-              <a:t>Točnost</a:t>
-            </a:r>
-            <a:r>
-              <a:rPr lang="en-US" dirty="0" smtClean="0"/>
-              <a:t> od </a:t>
-            </a:r>
-            <a:r>
-              <a:rPr lang="en-US" dirty="0" err="1" smtClean="0"/>
-              <a:t>barem</a:t>
-            </a:r>
-            <a:r>
-              <a:rPr lang="en-US" smtClean="0"/>
-              <a:t> 90%</a:t>
-            </a:r>
-            <a:endParaRPr lang="en-US" dirty="0"/>
+              <a:rPr lang="hr-HR" dirty="0" err="1" smtClean="0"/>
+              <a:t>prediction</a:t>
+            </a:r>
+            <a:r>
+              <a:rPr lang="hr-HR" dirty="0" smtClean="0"/>
+              <a:t>”</a:t>
+            </a:r>
+          </a:p>
+          <a:p>
+            <a:pPr lvl="1"/>
+            <a:r>
+              <a:rPr lang="hr-HR" dirty="0" smtClean="0"/>
+              <a:t>Točnost do 85%</a:t>
+            </a:r>
+          </a:p>
+          <a:p>
+            <a:pPr lvl="1"/>
+            <a:endParaRPr lang="hr-HR" dirty="0" smtClean="0"/>
+          </a:p>
+          <a:p>
+            <a:r>
+              <a:rPr lang="hr-HR" dirty="0" smtClean="0"/>
+              <a:t>Ocjena uspješnosti: </a:t>
+            </a:r>
+            <a:endParaRPr lang="hr-HR" dirty="0" smtClean="0"/>
+          </a:p>
+          <a:p>
+            <a:pPr lvl="1"/>
+            <a:r>
+              <a:rPr lang="hr-HR" dirty="0" smtClean="0"/>
+              <a:t>Preciznost</a:t>
+            </a:r>
+          </a:p>
+          <a:p>
+            <a:pPr lvl="1"/>
+            <a:r>
+              <a:rPr lang="hr-HR" dirty="0" smtClean="0"/>
+              <a:t>F1 </a:t>
+            </a:r>
+            <a:r>
+              <a:rPr lang="hr-HR" dirty="0" err="1" smtClean="0"/>
+              <a:t>score</a:t>
+            </a:r>
+            <a:endParaRPr lang="hr-HR" dirty="0" smtClean="0"/>
+          </a:p>
+          <a:p>
+            <a:pPr lvl="1"/>
+            <a:endParaRPr lang="hr-HR" dirty="0" smtClean="0"/>
+          </a:p>
+          <a:p>
+            <a:r>
+              <a:rPr lang="hr-HR" dirty="0" smtClean="0"/>
+              <a:t>Točnost od barem </a:t>
+            </a:r>
+            <a:r>
+              <a:rPr lang="hr-HR" dirty="0" smtClean="0"/>
+              <a:t>85</a:t>
+            </a:r>
+            <a:r>
+              <a:rPr lang="hr-HR" dirty="0" smtClean="0"/>
+              <a:t>%</a:t>
+            </a:r>
+            <a:endParaRPr lang="hr-HR" dirty="0"/>
           </a:p>
         </p:txBody>
       </p:sp>

</xml_diff>